<commit_message>
oox: disable gradient fill grab-bag for PPTX
This was added in commit 7f3762a70b15ea2ecebada02029d994580372f23
(ooxml: preserve gradient shape fill, 2014-01-31), and assumes that the
theme colors can be preserved, as the theme definition is grab-bagged as
well.

But the theme is grab-bagged only for DOCX, not for PPTX, so skip
gradient grab-bag for PPTX, otherwise the gradient would refer to
incorrect colors in the theme.

Change-Id: I98e1c67d4b10e68916f81dd7fc508eb4146d506b
Reviewed-on: https://gerrit.libreoffice.org/67386
Reviewed-by: Miklos Vajna <vmiklos@collabora.com>
Tested-by: Jenkins
</commit_message>
<xml_diff>
--- a/sd/qa/unit/data/pptx/tdf94238.pptx
+++ b/sd/qa/unit/data/pptx/tdf94238.pptx
@@ -1,13 +1,13 @@
 
 <file path=ppt/presentation.xml><?xml version="1.0" encoding="utf-8"?>
-<p:presentation xmlns:a="http://schemas.openxmlformats.org/drawingml/2006/main" xmlns:r="http://schemas.openxmlformats.org/officeDocument/2006/relationships" xmlns:p="http://schemas.openxmlformats.org/presentationml/2006/main" removePersonalInfoOnSave="1" saveSubsetFonts="1">
+<p:presentation xmlns:a="http://schemas.openxmlformats.org/drawingml/2006/main" xmlns:r="http://schemas.openxmlformats.org/officeDocument/2006/relationships" xmlns:p="http://schemas.openxmlformats.org/presentationml/2006/main" saveSubsetFonts="1">
   <p:sldMasterIdLst>
     <p:sldMasterId id="2147483648" r:id="rId1"/>
   </p:sldMasterIdLst>
   <p:sldIdLst>
     <p:sldId id="256" r:id="rId2"/>
   </p:sldIdLst>
-  <p:sldSz cx="12192000" cy="6858000"/>
+  <p:sldSz cx="9144000" cy="6858000" type="screen4x3"/>
   <p:notesSz cx="6858000" cy="9144000"/>
   <p:defaultTextStyle>
     <a:defPPr>
@@ -104,11 +104,6 @@
       </a:defRPr>
     </a:lvl9pPr>
   </p:defaultTextStyle>
-  <p:extLst>
-    <p:ext uri="{EFAFB233-063F-42B5-8137-9DF3F51BA10A}">
-      <p15:sldGuideLst xmlns:p15="http://schemas.microsoft.com/office/powerpoint/2012/main" xmlns=""/>
-    </p:ext>
-  </p:extLst>
 </p:presentation>
 </file>
 
@@ -141,17 +136,13 @@
         </p:nvSpPr>
         <p:spPr>
           <a:xfrm>
-            <a:off x="1524000" y="1122363"/>
-            <a:ext cx="9144000" cy="2387600"/>
+            <a:off x="685800" y="2130425"/>
+            <a:ext cx="7772400" cy="1470025"/>
           </a:xfrm>
         </p:spPr>
         <p:txBody>
-          <a:bodyPr anchor="b"/>
-          <a:lstStyle>
-            <a:lvl1pPr algn="ctr">
-              <a:defRPr sz="6000"/>
-            </a:lvl1pPr>
-          </a:lstStyle>
+          <a:bodyPr/>
+          <a:lstStyle/>
           <a:p>
             <a:r>
               <a:rPr lang="en-US" smtClean="0"/>
@@ -173,8 +164,8 @@
         </p:nvSpPr>
         <p:spPr>
           <a:xfrm>
-            <a:off x="1524000" y="3602038"/>
-            <a:ext cx="9144000" cy="1655762"/>
+            <a:off x="1371600" y="3886200"/>
+            <a:ext cx="6400800" cy="1752600"/>
           </a:xfrm>
         </p:spPr>
         <p:txBody>
@@ -182,39 +173,93 @@
           <a:lstStyle>
             <a:lvl1pPr marL="0" indent="0" algn="ctr">
               <a:buNone/>
-              <a:defRPr sz="2400"/>
+              <a:defRPr>
+                <a:solidFill>
+                  <a:schemeClr val="tx1">
+                    <a:tint val="75000"/>
+                  </a:schemeClr>
+                </a:solidFill>
+              </a:defRPr>
             </a:lvl1pPr>
             <a:lvl2pPr marL="457200" indent="0" algn="ctr">
               <a:buNone/>
-              <a:defRPr sz="2000"/>
+              <a:defRPr>
+                <a:solidFill>
+                  <a:schemeClr val="tx1">
+                    <a:tint val="75000"/>
+                  </a:schemeClr>
+                </a:solidFill>
+              </a:defRPr>
             </a:lvl2pPr>
             <a:lvl3pPr marL="914400" indent="0" algn="ctr">
               <a:buNone/>
-              <a:defRPr sz="1800"/>
+              <a:defRPr>
+                <a:solidFill>
+                  <a:schemeClr val="tx1">
+                    <a:tint val="75000"/>
+                  </a:schemeClr>
+                </a:solidFill>
+              </a:defRPr>
             </a:lvl3pPr>
             <a:lvl4pPr marL="1371600" indent="0" algn="ctr">
               <a:buNone/>
-              <a:defRPr sz="1600"/>
+              <a:defRPr>
+                <a:solidFill>
+                  <a:schemeClr val="tx1">
+                    <a:tint val="75000"/>
+                  </a:schemeClr>
+                </a:solidFill>
+              </a:defRPr>
             </a:lvl4pPr>
             <a:lvl5pPr marL="1828800" indent="0" algn="ctr">
               <a:buNone/>
-              <a:defRPr sz="1600"/>
+              <a:defRPr>
+                <a:solidFill>
+                  <a:schemeClr val="tx1">
+                    <a:tint val="75000"/>
+                  </a:schemeClr>
+                </a:solidFill>
+              </a:defRPr>
             </a:lvl5pPr>
             <a:lvl6pPr marL="2286000" indent="0" algn="ctr">
               <a:buNone/>
-              <a:defRPr sz="1600"/>
+              <a:defRPr>
+                <a:solidFill>
+                  <a:schemeClr val="tx1">
+                    <a:tint val="75000"/>
+                  </a:schemeClr>
+                </a:solidFill>
+              </a:defRPr>
             </a:lvl6pPr>
             <a:lvl7pPr marL="2743200" indent="0" algn="ctr">
               <a:buNone/>
-              <a:defRPr sz="1600"/>
+              <a:defRPr>
+                <a:solidFill>
+                  <a:schemeClr val="tx1">
+                    <a:tint val="75000"/>
+                  </a:schemeClr>
+                </a:solidFill>
+              </a:defRPr>
             </a:lvl7pPr>
             <a:lvl8pPr marL="3200400" indent="0" algn="ctr">
               <a:buNone/>
-              <a:defRPr sz="1600"/>
+              <a:defRPr>
+                <a:solidFill>
+                  <a:schemeClr val="tx1">
+                    <a:tint val="75000"/>
+                  </a:schemeClr>
+                </a:solidFill>
+              </a:defRPr>
             </a:lvl8pPr>
             <a:lvl9pPr marL="3657600" indent="0" algn="ctr">
               <a:buNone/>
-              <a:defRPr sz="1600"/>
+              <a:defRPr>
+                <a:solidFill>
+                  <a:schemeClr val="tx1">
+                    <a:tint val="75000"/>
+                  </a:schemeClr>
+                </a:solidFill>
+              </a:defRPr>
             </a:lvl9pPr>
           </a:lstStyle>
           <a:p>
@@ -241,9 +286,9 @@
           <a:bodyPr/>
           <a:lstStyle/>
           <a:p>
-            <a:fld id="{4A289710-70DF-40F8-A2B9-9434EBD2088F}" type="datetimeFigureOut">
-              <a:rPr lang="en-US" smtClean="0"/>
-              <a:t>1/30/2019</a:t>
+            <a:fld id="{04289767-09B2-4866-9B3B-D1AEAB1DA3E5}" type="datetimeFigureOut">
+              <a:rPr lang="en-US" smtClean="0"/>
+              <a:t>2/4/2019</a:t>
             </a:fld>
             <a:endParaRPr lang="en-US"/>
           </a:p>
@@ -283,7 +328,7 @@
           <a:bodyPr/>
           <a:lstStyle/>
           <a:p>
-            <a:fld id="{BCF62446-E778-48A5-B6CD-BB906881C890}" type="slidenum">
+            <a:fld id="{AEC6CF53-C46E-4BE6-AC26-A5EBA637B3A1}" type="slidenum">
               <a:rPr lang="en-US" smtClean="0"/>
               <a:t>‹#›</a:t>
             </a:fld>
@@ -294,7 +339,7 @@
     </p:spTree>
     <p:extLst>
       <p:ext uri="{BB962C8B-B14F-4D97-AF65-F5344CB8AC3E}">
-        <p14:creationId xmlns:p14="http://schemas.microsoft.com/office/powerpoint/2010/main" val="802796163"/>
+        <p14:creationId xmlns:p14="http://schemas.microsoft.com/office/powerpoint/2010/main" val="4038458653"/>
       </p:ext>
     </p:extLst>
   </p:cSld>
@@ -411,9 +456,9 @@
           <a:bodyPr/>
           <a:lstStyle/>
           <a:p>
-            <a:fld id="{4A289710-70DF-40F8-A2B9-9434EBD2088F}" type="datetimeFigureOut">
-              <a:rPr lang="en-US" smtClean="0"/>
-              <a:t>1/30/2019</a:t>
+            <a:fld id="{04289767-09B2-4866-9B3B-D1AEAB1DA3E5}" type="datetimeFigureOut">
+              <a:rPr lang="en-US" smtClean="0"/>
+              <a:t>2/4/2019</a:t>
             </a:fld>
             <a:endParaRPr lang="en-US"/>
           </a:p>
@@ -453,7 +498,7 @@
           <a:bodyPr/>
           <a:lstStyle/>
           <a:p>
-            <a:fld id="{BCF62446-E778-48A5-B6CD-BB906881C890}" type="slidenum">
+            <a:fld id="{AEC6CF53-C46E-4BE6-AC26-A5EBA637B3A1}" type="slidenum">
               <a:rPr lang="en-US" smtClean="0"/>
               <a:t>‹#›</a:t>
             </a:fld>
@@ -464,7 +509,7 @@
     </p:spTree>
     <p:extLst>
       <p:ext uri="{BB962C8B-B14F-4D97-AF65-F5344CB8AC3E}">
-        <p14:creationId xmlns:p14="http://schemas.microsoft.com/office/powerpoint/2010/main" val="262080850"/>
+        <p14:creationId xmlns:p14="http://schemas.microsoft.com/office/powerpoint/2010/main" val="1637979783"/>
       </p:ext>
     </p:extLst>
   </p:cSld>
@@ -503,8 +548,8 @@
         </p:nvSpPr>
         <p:spPr>
           <a:xfrm>
-            <a:off x="8724900" y="365125"/>
-            <a:ext cx="2628900" cy="5811838"/>
+            <a:off x="6629400" y="274638"/>
+            <a:ext cx="2057400" cy="5851525"/>
           </a:xfrm>
         </p:spPr>
         <p:txBody>
@@ -531,8 +576,8 @@
         </p:nvSpPr>
         <p:spPr>
           <a:xfrm>
-            <a:off x="838200" y="365125"/>
-            <a:ext cx="7734300" cy="5811838"/>
+            <a:off x="457200" y="274638"/>
+            <a:ext cx="6019800" cy="5851525"/>
           </a:xfrm>
         </p:spPr>
         <p:txBody>
@@ -591,9 +636,9 @@
           <a:bodyPr/>
           <a:lstStyle/>
           <a:p>
-            <a:fld id="{4A289710-70DF-40F8-A2B9-9434EBD2088F}" type="datetimeFigureOut">
-              <a:rPr lang="en-US" smtClean="0"/>
-              <a:t>1/30/2019</a:t>
+            <a:fld id="{04289767-09B2-4866-9B3B-D1AEAB1DA3E5}" type="datetimeFigureOut">
+              <a:rPr lang="en-US" smtClean="0"/>
+              <a:t>2/4/2019</a:t>
             </a:fld>
             <a:endParaRPr lang="en-US"/>
           </a:p>
@@ -633,7 +678,7 @@
           <a:bodyPr/>
           <a:lstStyle/>
           <a:p>
-            <a:fld id="{BCF62446-E778-48A5-B6CD-BB906881C890}" type="slidenum">
+            <a:fld id="{AEC6CF53-C46E-4BE6-AC26-A5EBA637B3A1}" type="slidenum">
               <a:rPr lang="en-US" smtClean="0"/>
               <a:t>‹#›</a:t>
             </a:fld>
@@ -644,7 +689,7 @@
     </p:spTree>
     <p:extLst>
       <p:ext uri="{BB962C8B-B14F-4D97-AF65-F5344CB8AC3E}">
-        <p14:creationId xmlns:p14="http://schemas.microsoft.com/office/powerpoint/2010/main" val="3853525198"/>
+        <p14:creationId xmlns:p14="http://schemas.microsoft.com/office/powerpoint/2010/main" val="2460003714"/>
       </p:ext>
     </p:extLst>
   </p:cSld>
@@ -761,9 +806,9 @@
           <a:bodyPr/>
           <a:lstStyle/>
           <a:p>
-            <a:fld id="{4A289710-70DF-40F8-A2B9-9434EBD2088F}" type="datetimeFigureOut">
-              <a:rPr lang="en-US" smtClean="0"/>
-              <a:t>1/30/2019</a:t>
+            <a:fld id="{04289767-09B2-4866-9B3B-D1AEAB1DA3E5}" type="datetimeFigureOut">
+              <a:rPr lang="en-US" smtClean="0"/>
+              <a:t>2/4/2019</a:t>
             </a:fld>
             <a:endParaRPr lang="en-US"/>
           </a:p>
@@ -803,7 +848,7 @@
           <a:bodyPr/>
           <a:lstStyle/>
           <a:p>
-            <a:fld id="{BCF62446-E778-48A5-B6CD-BB906881C890}" type="slidenum">
+            <a:fld id="{AEC6CF53-C46E-4BE6-AC26-A5EBA637B3A1}" type="slidenum">
               <a:rPr lang="en-US" smtClean="0"/>
               <a:t>‹#›</a:t>
             </a:fld>
@@ -814,7 +859,7 @@
     </p:spTree>
     <p:extLst>
       <p:ext uri="{BB962C8B-B14F-4D97-AF65-F5344CB8AC3E}">
-        <p14:creationId xmlns:p14="http://schemas.microsoft.com/office/powerpoint/2010/main" val="1944618025"/>
+        <p14:creationId xmlns:p14="http://schemas.microsoft.com/office/powerpoint/2010/main" val="3479538752"/>
       </p:ext>
     </p:extLst>
   </p:cSld>
@@ -853,48 +898,48 @@
         </p:nvSpPr>
         <p:spPr>
           <a:xfrm>
-            <a:off x="831850" y="1709738"/>
-            <a:ext cx="10515600" cy="2852737"/>
+            <a:off x="722313" y="4406900"/>
+            <a:ext cx="7772400" cy="1362075"/>
           </a:xfrm>
         </p:spPr>
         <p:txBody>
+          <a:bodyPr anchor="t"/>
+          <a:lstStyle>
+            <a:lvl1pPr algn="l">
+              <a:defRPr sz="4000" b="1" cap="all"/>
+            </a:lvl1pPr>
+          </a:lstStyle>
+          <a:p>
+            <a:r>
+              <a:rPr lang="en-US" smtClean="0"/>
+              <a:t>Click to edit Master title style</a:t>
+            </a:r>
+            <a:endParaRPr lang="en-US"/>
+          </a:p>
+        </p:txBody>
+      </p:sp>
+      <p:sp>
+        <p:nvSpPr>
+          <p:cNvPr id="3" name="Text Placeholder 2"/>
+          <p:cNvSpPr>
+            <a:spLocks noGrp="1"/>
+          </p:cNvSpPr>
+          <p:nvPr>
+            <p:ph type="body" idx="1"/>
+          </p:nvPr>
+        </p:nvSpPr>
+        <p:spPr>
+          <a:xfrm>
+            <a:off x="722313" y="2906713"/>
+            <a:ext cx="7772400" cy="1500187"/>
+          </a:xfrm>
+        </p:spPr>
+        <p:txBody>
           <a:bodyPr anchor="b"/>
           <a:lstStyle>
-            <a:lvl1pPr>
-              <a:defRPr sz="6000"/>
-            </a:lvl1pPr>
-          </a:lstStyle>
-          <a:p>
-            <a:r>
-              <a:rPr lang="en-US" smtClean="0"/>
-              <a:t>Click to edit Master title style</a:t>
-            </a:r>
-            <a:endParaRPr lang="en-US"/>
-          </a:p>
-        </p:txBody>
-      </p:sp>
-      <p:sp>
-        <p:nvSpPr>
-          <p:cNvPr id="3" name="Text Placeholder 2"/>
-          <p:cNvSpPr>
-            <a:spLocks noGrp="1"/>
-          </p:cNvSpPr>
-          <p:nvPr>
-            <p:ph type="body" idx="1"/>
-          </p:nvPr>
-        </p:nvSpPr>
-        <p:spPr>
-          <a:xfrm>
-            <a:off x="831850" y="4589463"/>
-            <a:ext cx="10515600" cy="1500187"/>
-          </a:xfrm>
-        </p:spPr>
-        <p:txBody>
-          <a:bodyPr/>
-          <a:lstStyle>
             <a:lvl1pPr marL="0" indent="0">
               <a:buNone/>
-              <a:defRPr sz="2400">
+              <a:defRPr sz="2000">
                 <a:solidFill>
                   <a:schemeClr val="tx1">
                     <a:tint val="75000"/>
@@ -904,7 +949,7 @@
             </a:lvl1pPr>
             <a:lvl2pPr marL="457200" indent="0">
               <a:buNone/>
-              <a:defRPr sz="2000">
+              <a:defRPr sz="1800">
                 <a:solidFill>
                   <a:schemeClr val="tx1">
                     <a:tint val="75000"/>
@@ -914,7 +959,7 @@
             </a:lvl2pPr>
             <a:lvl3pPr marL="914400" indent="0">
               <a:buNone/>
-              <a:defRPr sz="1800">
+              <a:defRPr sz="1600">
                 <a:solidFill>
                   <a:schemeClr val="tx1">
                     <a:tint val="75000"/>
@@ -924,7 +969,7 @@
             </a:lvl3pPr>
             <a:lvl4pPr marL="1371600" indent="0">
               <a:buNone/>
-              <a:defRPr sz="1600">
+              <a:defRPr sz="1400">
                 <a:solidFill>
                   <a:schemeClr val="tx1">
                     <a:tint val="75000"/>
@@ -934,7 +979,7 @@
             </a:lvl4pPr>
             <a:lvl5pPr marL="1828800" indent="0">
               <a:buNone/>
-              <a:defRPr sz="1600">
+              <a:defRPr sz="1400">
                 <a:solidFill>
                   <a:schemeClr val="tx1">
                     <a:tint val="75000"/>
@@ -944,7 +989,7 @@
             </a:lvl5pPr>
             <a:lvl6pPr marL="2286000" indent="0">
               <a:buNone/>
-              <a:defRPr sz="1600">
+              <a:defRPr sz="1400">
                 <a:solidFill>
                   <a:schemeClr val="tx1">
                     <a:tint val="75000"/>
@@ -954,7 +999,7 @@
             </a:lvl6pPr>
             <a:lvl7pPr marL="2743200" indent="0">
               <a:buNone/>
-              <a:defRPr sz="1600">
+              <a:defRPr sz="1400">
                 <a:solidFill>
                   <a:schemeClr val="tx1">
                     <a:tint val="75000"/>
@@ -964,7 +1009,7 @@
             </a:lvl7pPr>
             <a:lvl8pPr marL="3200400" indent="0">
               <a:buNone/>
-              <a:defRPr sz="1600">
+              <a:defRPr sz="1400">
                 <a:solidFill>
                   <a:schemeClr val="tx1">
                     <a:tint val="75000"/>
@@ -974,7 +1019,7 @@
             </a:lvl8pPr>
             <a:lvl9pPr marL="3657600" indent="0">
               <a:buNone/>
-              <a:defRPr sz="1600">
+              <a:defRPr sz="1400">
                 <a:solidFill>
                   <a:schemeClr val="tx1">
                     <a:tint val="75000"/>
@@ -1007,9 +1052,9 @@
           <a:bodyPr/>
           <a:lstStyle/>
           <a:p>
-            <a:fld id="{4A289710-70DF-40F8-A2B9-9434EBD2088F}" type="datetimeFigureOut">
-              <a:rPr lang="en-US" smtClean="0"/>
-              <a:t>1/30/2019</a:t>
+            <a:fld id="{04289767-09B2-4866-9B3B-D1AEAB1DA3E5}" type="datetimeFigureOut">
+              <a:rPr lang="en-US" smtClean="0"/>
+              <a:t>2/4/2019</a:t>
             </a:fld>
             <a:endParaRPr lang="en-US"/>
           </a:p>
@@ -1049,7 +1094,7 @@
           <a:bodyPr/>
           <a:lstStyle/>
           <a:p>
-            <a:fld id="{BCF62446-E778-48A5-B6CD-BB906881C890}" type="slidenum">
+            <a:fld id="{AEC6CF53-C46E-4BE6-AC26-A5EBA637B3A1}" type="slidenum">
               <a:rPr lang="en-US" smtClean="0"/>
               <a:t>‹#›</a:t>
             </a:fld>
@@ -1060,7 +1105,7 @@
     </p:spTree>
     <p:extLst>
       <p:ext uri="{BB962C8B-B14F-4D97-AF65-F5344CB8AC3E}">
-        <p14:creationId xmlns:p14="http://schemas.microsoft.com/office/powerpoint/2010/main" val="2928061661"/>
+        <p14:creationId xmlns:p14="http://schemas.microsoft.com/office/powerpoint/2010/main" val="950932307"/>
       </p:ext>
     </p:extLst>
   </p:cSld>
@@ -1122,13 +1167,41 @@
         </p:nvSpPr>
         <p:spPr>
           <a:xfrm>
-            <a:off x="838200" y="1825625"/>
-            <a:ext cx="5181600" cy="4351338"/>
+            <a:off x="457200" y="1600200"/>
+            <a:ext cx="4038600" cy="4525963"/>
           </a:xfrm>
         </p:spPr>
         <p:txBody>
           <a:bodyPr/>
-          <a:lstStyle/>
+          <a:lstStyle>
+            <a:lvl1pPr>
+              <a:defRPr sz="2800"/>
+            </a:lvl1pPr>
+            <a:lvl2pPr>
+              <a:defRPr sz="2400"/>
+            </a:lvl2pPr>
+            <a:lvl3pPr>
+              <a:defRPr sz="2000"/>
+            </a:lvl3pPr>
+            <a:lvl4pPr>
+              <a:defRPr sz="1800"/>
+            </a:lvl4pPr>
+            <a:lvl5pPr>
+              <a:defRPr sz="1800"/>
+            </a:lvl5pPr>
+            <a:lvl6pPr>
+              <a:defRPr sz="1800"/>
+            </a:lvl6pPr>
+            <a:lvl7pPr>
+              <a:defRPr sz="1800"/>
+            </a:lvl7pPr>
+            <a:lvl8pPr>
+              <a:defRPr sz="1800"/>
+            </a:lvl8pPr>
+            <a:lvl9pPr>
+              <a:defRPr sz="1800"/>
+            </a:lvl9pPr>
+          </a:lstStyle>
           <a:p>
             <a:pPr lvl="0"/>
             <a:r>
@@ -1179,13 +1252,41 @@
         </p:nvSpPr>
         <p:spPr>
           <a:xfrm>
-            <a:off x="6172200" y="1825625"/>
-            <a:ext cx="5181600" cy="4351338"/>
+            <a:off x="4648200" y="1600200"/>
+            <a:ext cx="4038600" cy="4525963"/>
           </a:xfrm>
         </p:spPr>
         <p:txBody>
           <a:bodyPr/>
-          <a:lstStyle/>
+          <a:lstStyle>
+            <a:lvl1pPr>
+              <a:defRPr sz="2800"/>
+            </a:lvl1pPr>
+            <a:lvl2pPr>
+              <a:defRPr sz="2400"/>
+            </a:lvl2pPr>
+            <a:lvl3pPr>
+              <a:defRPr sz="2000"/>
+            </a:lvl3pPr>
+            <a:lvl4pPr>
+              <a:defRPr sz="1800"/>
+            </a:lvl4pPr>
+            <a:lvl5pPr>
+              <a:defRPr sz="1800"/>
+            </a:lvl5pPr>
+            <a:lvl6pPr>
+              <a:defRPr sz="1800"/>
+            </a:lvl6pPr>
+            <a:lvl7pPr>
+              <a:defRPr sz="1800"/>
+            </a:lvl7pPr>
+            <a:lvl8pPr>
+              <a:defRPr sz="1800"/>
+            </a:lvl8pPr>
+            <a:lvl9pPr>
+              <a:defRPr sz="1800"/>
+            </a:lvl9pPr>
+          </a:lstStyle>
           <a:p>
             <a:pPr lvl="0"/>
             <a:r>
@@ -1239,9 +1340,9 @@
           <a:bodyPr/>
           <a:lstStyle/>
           <a:p>
-            <a:fld id="{4A289710-70DF-40F8-A2B9-9434EBD2088F}" type="datetimeFigureOut">
-              <a:rPr lang="en-US" smtClean="0"/>
-              <a:t>1/30/2019</a:t>
+            <a:fld id="{04289767-09B2-4866-9B3B-D1AEAB1DA3E5}" type="datetimeFigureOut">
+              <a:rPr lang="en-US" smtClean="0"/>
+              <a:t>2/4/2019</a:t>
             </a:fld>
             <a:endParaRPr lang="en-US"/>
           </a:p>
@@ -1281,7 +1382,7 @@
           <a:bodyPr/>
           <a:lstStyle/>
           <a:p>
-            <a:fld id="{BCF62446-E778-48A5-B6CD-BB906881C890}" type="slidenum">
+            <a:fld id="{AEC6CF53-C46E-4BE6-AC26-A5EBA637B3A1}" type="slidenum">
               <a:rPr lang="en-US" smtClean="0"/>
               <a:t>‹#›</a:t>
             </a:fld>
@@ -1292,7 +1393,7 @@
     </p:spTree>
     <p:extLst>
       <p:ext uri="{BB962C8B-B14F-4D97-AF65-F5344CB8AC3E}">
-        <p14:creationId xmlns:p14="http://schemas.microsoft.com/office/powerpoint/2010/main" val="1918814331"/>
+        <p14:creationId xmlns:p14="http://schemas.microsoft.com/office/powerpoint/2010/main" val="4261126237"/>
       </p:ext>
     </p:extLst>
   </p:cSld>
@@ -1329,38 +1430,37 @@
             <p:ph type="title"/>
           </p:nvPr>
         </p:nvSpPr>
+        <p:spPr/>
+        <p:txBody>
+          <a:bodyPr/>
+          <a:lstStyle>
+            <a:lvl1pPr>
+              <a:defRPr/>
+            </a:lvl1pPr>
+          </a:lstStyle>
+          <a:p>
+            <a:r>
+              <a:rPr lang="en-US" smtClean="0"/>
+              <a:t>Click to edit Master title style</a:t>
+            </a:r>
+            <a:endParaRPr lang="en-US"/>
+          </a:p>
+        </p:txBody>
+      </p:sp>
+      <p:sp>
+        <p:nvSpPr>
+          <p:cNvPr id="3" name="Text Placeholder 2"/>
+          <p:cNvSpPr>
+            <a:spLocks noGrp="1"/>
+          </p:cNvSpPr>
+          <p:nvPr>
+            <p:ph type="body" idx="1"/>
+          </p:nvPr>
+        </p:nvSpPr>
         <p:spPr>
           <a:xfrm>
-            <a:off x="839788" y="365125"/>
-            <a:ext cx="10515600" cy="1325563"/>
-          </a:xfrm>
-        </p:spPr>
-        <p:txBody>
-          <a:bodyPr/>
-          <a:lstStyle/>
-          <a:p>
-            <a:r>
-              <a:rPr lang="en-US" smtClean="0"/>
-              <a:t>Click to edit Master title style</a:t>
-            </a:r>
-            <a:endParaRPr lang="en-US"/>
-          </a:p>
-        </p:txBody>
-      </p:sp>
-      <p:sp>
-        <p:nvSpPr>
-          <p:cNvPr id="3" name="Text Placeholder 2"/>
-          <p:cNvSpPr>
-            <a:spLocks noGrp="1"/>
-          </p:cNvSpPr>
-          <p:nvPr>
-            <p:ph type="body" idx="1"/>
-          </p:nvPr>
-        </p:nvSpPr>
-        <p:spPr>
-          <a:xfrm>
-            <a:off x="839788" y="1681163"/>
-            <a:ext cx="5157787" cy="823912"/>
+            <a:off x="457200" y="1535113"/>
+            <a:ext cx="4040188" cy="639762"/>
           </a:xfrm>
         </p:spPr>
         <p:txBody>
@@ -1424,13 +1524,41 @@
         </p:nvSpPr>
         <p:spPr>
           <a:xfrm>
-            <a:off x="839788" y="2505075"/>
-            <a:ext cx="5157787" cy="3684588"/>
+            <a:off x="457200" y="2174875"/>
+            <a:ext cx="4040188" cy="3951288"/>
           </a:xfrm>
         </p:spPr>
         <p:txBody>
           <a:bodyPr/>
-          <a:lstStyle/>
+          <a:lstStyle>
+            <a:lvl1pPr>
+              <a:defRPr sz="2400"/>
+            </a:lvl1pPr>
+            <a:lvl2pPr>
+              <a:defRPr sz="2000"/>
+            </a:lvl2pPr>
+            <a:lvl3pPr>
+              <a:defRPr sz="1800"/>
+            </a:lvl3pPr>
+            <a:lvl4pPr>
+              <a:defRPr sz="1600"/>
+            </a:lvl4pPr>
+            <a:lvl5pPr>
+              <a:defRPr sz="1600"/>
+            </a:lvl5pPr>
+            <a:lvl6pPr>
+              <a:defRPr sz="1600"/>
+            </a:lvl6pPr>
+            <a:lvl7pPr>
+              <a:defRPr sz="1600"/>
+            </a:lvl7pPr>
+            <a:lvl8pPr>
+              <a:defRPr sz="1600"/>
+            </a:lvl8pPr>
+            <a:lvl9pPr>
+              <a:defRPr sz="1600"/>
+            </a:lvl9pPr>
+          </a:lstStyle>
           <a:p>
             <a:pPr lvl="0"/>
             <a:r>
@@ -1481,8 +1609,8 @@
         </p:nvSpPr>
         <p:spPr>
           <a:xfrm>
-            <a:off x="6172200" y="1681163"/>
-            <a:ext cx="5183188" cy="823912"/>
+            <a:off x="4645025" y="1535113"/>
+            <a:ext cx="4041775" cy="639762"/>
           </a:xfrm>
         </p:spPr>
         <p:txBody>
@@ -1546,13 +1674,41 @@
         </p:nvSpPr>
         <p:spPr>
           <a:xfrm>
-            <a:off x="6172200" y="2505075"/>
-            <a:ext cx="5183188" cy="3684588"/>
+            <a:off x="4645025" y="2174875"/>
+            <a:ext cx="4041775" cy="3951288"/>
           </a:xfrm>
         </p:spPr>
         <p:txBody>
           <a:bodyPr/>
-          <a:lstStyle/>
+          <a:lstStyle>
+            <a:lvl1pPr>
+              <a:defRPr sz="2400"/>
+            </a:lvl1pPr>
+            <a:lvl2pPr>
+              <a:defRPr sz="2000"/>
+            </a:lvl2pPr>
+            <a:lvl3pPr>
+              <a:defRPr sz="1800"/>
+            </a:lvl3pPr>
+            <a:lvl4pPr>
+              <a:defRPr sz="1600"/>
+            </a:lvl4pPr>
+            <a:lvl5pPr>
+              <a:defRPr sz="1600"/>
+            </a:lvl5pPr>
+            <a:lvl6pPr>
+              <a:defRPr sz="1600"/>
+            </a:lvl6pPr>
+            <a:lvl7pPr>
+              <a:defRPr sz="1600"/>
+            </a:lvl7pPr>
+            <a:lvl8pPr>
+              <a:defRPr sz="1600"/>
+            </a:lvl8pPr>
+            <a:lvl9pPr>
+              <a:defRPr sz="1600"/>
+            </a:lvl9pPr>
+          </a:lstStyle>
           <a:p>
             <a:pPr lvl="0"/>
             <a:r>
@@ -1606,9 +1762,9 @@
           <a:bodyPr/>
           <a:lstStyle/>
           <a:p>
-            <a:fld id="{4A289710-70DF-40F8-A2B9-9434EBD2088F}" type="datetimeFigureOut">
-              <a:rPr lang="en-US" smtClean="0"/>
-              <a:t>1/30/2019</a:t>
+            <a:fld id="{04289767-09B2-4866-9B3B-D1AEAB1DA3E5}" type="datetimeFigureOut">
+              <a:rPr lang="en-US" smtClean="0"/>
+              <a:t>2/4/2019</a:t>
             </a:fld>
             <a:endParaRPr lang="en-US"/>
           </a:p>
@@ -1648,7 +1804,7 @@
           <a:bodyPr/>
           <a:lstStyle/>
           <a:p>
-            <a:fld id="{BCF62446-E778-48A5-B6CD-BB906881C890}" type="slidenum">
+            <a:fld id="{AEC6CF53-C46E-4BE6-AC26-A5EBA637B3A1}" type="slidenum">
               <a:rPr lang="en-US" smtClean="0"/>
               <a:t>‹#›</a:t>
             </a:fld>
@@ -1659,7 +1815,7 @@
     </p:spTree>
     <p:extLst>
       <p:ext uri="{BB962C8B-B14F-4D97-AF65-F5344CB8AC3E}">
-        <p14:creationId xmlns:p14="http://schemas.microsoft.com/office/powerpoint/2010/main" val="1789548967"/>
+        <p14:creationId xmlns:p14="http://schemas.microsoft.com/office/powerpoint/2010/main" val="2836565929"/>
       </p:ext>
     </p:extLst>
   </p:cSld>
@@ -1724,9 +1880,9 @@
           <a:bodyPr/>
           <a:lstStyle/>
           <a:p>
-            <a:fld id="{4A289710-70DF-40F8-A2B9-9434EBD2088F}" type="datetimeFigureOut">
-              <a:rPr lang="en-US" smtClean="0"/>
-              <a:t>1/30/2019</a:t>
+            <a:fld id="{04289767-09B2-4866-9B3B-D1AEAB1DA3E5}" type="datetimeFigureOut">
+              <a:rPr lang="en-US" smtClean="0"/>
+              <a:t>2/4/2019</a:t>
             </a:fld>
             <a:endParaRPr lang="en-US"/>
           </a:p>
@@ -1766,7 +1922,7 @@
           <a:bodyPr/>
           <a:lstStyle/>
           <a:p>
-            <a:fld id="{BCF62446-E778-48A5-B6CD-BB906881C890}" type="slidenum">
+            <a:fld id="{AEC6CF53-C46E-4BE6-AC26-A5EBA637B3A1}" type="slidenum">
               <a:rPr lang="en-US" smtClean="0"/>
               <a:t>‹#›</a:t>
             </a:fld>
@@ -1777,7 +1933,7 @@
     </p:spTree>
     <p:extLst>
       <p:ext uri="{BB962C8B-B14F-4D97-AF65-F5344CB8AC3E}">
-        <p14:creationId xmlns:p14="http://schemas.microsoft.com/office/powerpoint/2010/main" val="1157463973"/>
+        <p14:creationId xmlns:p14="http://schemas.microsoft.com/office/powerpoint/2010/main" val="2041586275"/>
       </p:ext>
     </p:extLst>
   </p:cSld>
@@ -1819,9 +1975,9 @@
           <a:bodyPr/>
           <a:lstStyle/>
           <a:p>
-            <a:fld id="{4A289710-70DF-40F8-A2B9-9434EBD2088F}" type="datetimeFigureOut">
-              <a:rPr lang="en-US" smtClean="0"/>
-              <a:t>1/30/2019</a:t>
+            <a:fld id="{04289767-09B2-4866-9B3B-D1AEAB1DA3E5}" type="datetimeFigureOut">
+              <a:rPr lang="en-US" smtClean="0"/>
+              <a:t>2/4/2019</a:t>
             </a:fld>
             <a:endParaRPr lang="en-US"/>
           </a:p>
@@ -1861,7 +2017,7 @@
           <a:bodyPr/>
           <a:lstStyle/>
           <a:p>
-            <a:fld id="{BCF62446-E778-48A5-B6CD-BB906881C890}" type="slidenum">
+            <a:fld id="{AEC6CF53-C46E-4BE6-AC26-A5EBA637B3A1}" type="slidenum">
               <a:rPr lang="en-US" smtClean="0"/>
               <a:t>‹#›</a:t>
             </a:fld>
@@ -1872,7 +2028,7 @@
     </p:spTree>
     <p:extLst>
       <p:ext uri="{BB962C8B-B14F-4D97-AF65-F5344CB8AC3E}">
-        <p14:creationId xmlns:p14="http://schemas.microsoft.com/office/powerpoint/2010/main" val="3362268628"/>
+        <p14:creationId xmlns:p14="http://schemas.microsoft.com/office/powerpoint/2010/main" val="4177371432"/>
       </p:ext>
     </p:extLst>
   </p:cSld>
@@ -1911,15 +2067,15 @@
         </p:nvSpPr>
         <p:spPr>
           <a:xfrm>
-            <a:off x="839788" y="457200"/>
-            <a:ext cx="3932237" cy="1600200"/>
+            <a:off x="457200" y="273050"/>
+            <a:ext cx="3008313" cy="1162050"/>
           </a:xfrm>
         </p:spPr>
         <p:txBody>
           <a:bodyPr anchor="b"/>
           <a:lstStyle>
-            <a:lvl1pPr>
-              <a:defRPr sz="3200"/>
+            <a:lvl1pPr algn="l">
+              <a:defRPr sz="2000" b="1"/>
             </a:lvl1pPr>
           </a:lstStyle>
           <a:p>
@@ -1943,8 +2099,8 @@
         </p:nvSpPr>
         <p:spPr>
           <a:xfrm>
-            <a:off x="5183188" y="987425"/>
-            <a:ext cx="6172200" cy="4873625"/>
+            <a:off x="3575050" y="273050"/>
+            <a:ext cx="5111750" cy="5853113"/>
           </a:xfrm>
         </p:spPr>
         <p:txBody>
@@ -2028,8 +2184,8 @@
         </p:nvSpPr>
         <p:spPr>
           <a:xfrm>
-            <a:off x="839788" y="2057400"/>
-            <a:ext cx="3932237" cy="3811588"/>
+            <a:off x="457200" y="1435100"/>
+            <a:ext cx="3008313" cy="4691063"/>
           </a:xfrm>
         </p:spPr>
         <p:txBody>
@@ -2037,39 +2193,39 @@
           <a:lstStyle>
             <a:lvl1pPr marL="0" indent="0">
               <a:buNone/>
-              <a:defRPr sz="1600"/>
+              <a:defRPr sz="1400"/>
             </a:lvl1pPr>
             <a:lvl2pPr marL="457200" indent="0">
               <a:buNone/>
-              <a:defRPr sz="1400"/>
+              <a:defRPr sz="1200"/>
             </a:lvl2pPr>
             <a:lvl3pPr marL="914400" indent="0">
               <a:buNone/>
-              <a:defRPr sz="1200"/>
+              <a:defRPr sz="1000"/>
             </a:lvl3pPr>
             <a:lvl4pPr marL="1371600" indent="0">
               <a:buNone/>
-              <a:defRPr sz="1000"/>
+              <a:defRPr sz="900"/>
             </a:lvl4pPr>
             <a:lvl5pPr marL="1828800" indent="0">
               <a:buNone/>
-              <a:defRPr sz="1000"/>
+              <a:defRPr sz="900"/>
             </a:lvl5pPr>
             <a:lvl6pPr marL="2286000" indent="0">
               <a:buNone/>
-              <a:defRPr sz="1000"/>
+              <a:defRPr sz="900"/>
             </a:lvl6pPr>
             <a:lvl7pPr marL="2743200" indent="0">
               <a:buNone/>
-              <a:defRPr sz="1000"/>
+              <a:defRPr sz="900"/>
             </a:lvl7pPr>
             <a:lvl8pPr marL="3200400" indent="0">
               <a:buNone/>
-              <a:defRPr sz="1000"/>
+              <a:defRPr sz="900"/>
             </a:lvl8pPr>
             <a:lvl9pPr marL="3657600" indent="0">
               <a:buNone/>
-              <a:defRPr sz="1000"/>
+              <a:defRPr sz="900"/>
             </a:lvl9pPr>
           </a:lstStyle>
           <a:p>
@@ -2096,9 +2252,9 @@
           <a:bodyPr/>
           <a:lstStyle/>
           <a:p>
-            <a:fld id="{4A289710-70DF-40F8-A2B9-9434EBD2088F}" type="datetimeFigureOut">
-              <a:rPr lang="en-US" smtClean="0"/>
-              <a:t>1/30/2019</a:t>
+            <a:fld id="{04289767-09B2-4866-9B3B-D1AEAB1DA3E5}" type="datetimeFigureOut">
+              <a:rPr lang="en-US" smtClean="0"/>
+              <a:t>2/4/2019</a:t>
             </a:fld>
             <a:endParaRPr lang="en-US"/>
           </a:p>
@@ -2138,7 +2294,7 @@
           <a:bodyPr/>
           <a:lstStyle/>
           <a:p>
-            <a:fld id="{BCF62446-E778-48A5-B6CD-BB906881C890}" type="slidenum">
+            <a:fld id="{AEC6CF53-C46E-4BE6-AC26-A5EBA637B3A1}" type="slidenum">
               <a:rPr lang="en-US" smtClean="0"/>
               <a:t>‹#›</a:t>
             </a:fld>
@@ -2149,7 +2305,7 @@
     </p:spTree>
     <p:extLst>
       <p:ext uri="{BB962C8B-B14F-4D97-AF65-F5344CB8AC3E}">
-        <p14:creationId xmlns:p14="http://schemas.microsoft.com/office/powerpoint/2010/main" val="3805841742"/>
+        <p14:creationId xmlns:p14="http://schemas.microsoft.com/office/powerpoint/2010/main" val="4261705621"/>
       </p:ext>
     </p:extLst>
   </p:cSld>
@@ -2188,15 +2344,15 @@
         </p:nvSpPr>
         <p:spPr>
           <a:xfrm>
-            <a:off x="839788" y="457200"/>
-            <a:ext cx="3932237" cy="1600200"/>
+            <a:off x="1792288" y="4800600"/>
+            <a:ext cx="5486400" cy="566738"/>
           </a:xfrm>
         </p:spPr>
         <p:txBody>
           <a:bodyPr anchor="b"/>
           <a:lstStyle>
-            <a:lvl1pPr>
-              <a:defRPr sz="3200"/>
+            <a:lvl1pPr algn="l">
+              <a:defRPr sz="2000" b="1"/>
             </a:lvl1pPr>
           </a:lstStyle>
           <a:p>
@@ -2220,8 +2376,8 @@
         </p:nvSpPr>
         <p:spPr>
           <a:xfrm>
-            <a:off x="5183188" y="987425"/>
-            <a:ext cx="6172200" cy="4873625"/>
+            <a:off x="1792288" y="612775"/>
+            <a:ext cx="5486400" cy="4114800"/>
           </a:xfrm>
         </p:spPr>
         <p:txBody>
@@ -2281,8 +2437,8 @@
         </p:nvSpPr>
         <p:spPr>
           <a:xfrm>
-            <a:off x="839788" y="2057400"/>
-            <a:ext cx="3932237" cy="3811588"/>
+            <a:off x="1792288" y="5367338"/>
+            <a:ext cx="5486400" cy="804862"/>
           </a:xfrm>
         </p:spPr>
         <p:txBody>
@@ -2290,39 +2446,39 @@
           <a:lstStyle>
             <a:lvl1pPr marL="0" indent="0">
               <a:buNone/>
-              <a:defRPr sz="1600"/>
+              <a:defRPr sz="1400"/>
             </a:lvl1pPr>
             <a:lvl2pPr marL="457200" indent="0">
               <a:buNone/>
-              <a:defRPr sz="1400"/>
+              <a:defRPr sz="1200"/>
             </a:lvl2pPr>
             <a:lvl3pPr marL="914400" indent="0">
               <a:buNone/>
-              <a:defRPr sz="1200"/>
+              <a:defRPr sz="1000"/>
             </a:lvl3pPr>
             <a:lvl4pPr marL="1371600" indent="0">
               <a:buNone/>
-              <a:defRPr sz="1000"/>
+              <a:defRPr sz="900"/>
             </a:lvl4pPr>
             <a:lvl5pPr marL="1828800" indent="0">
               <a:buNone/>
-              <a:defRPr sz="1000"/>
+              <a:defRPr sz="900"/>
             </a:lvl5pPr>
             <a:lvl6pPr marL="2286000" indent="0">
               <a:buNone/>
-              <a:defRPr sz="1000"/>
+              <a:defRPr sz="900"/>
             </a:lvl6pPr>
             <a:lvl7pPr marL="2743200" indent="0">
               <a:buNone/>
-              <a:defRPr sz="1000"/>
+              <a:defRPr sz="900"/>
             </a:lvl7pPr>
             <a:lvl8pPr marL="3200400" indent="0">
               <a:buNone/>
-              <a:defRPr sz="1000"/>
+              <a:defRPr sz="900"/>
             </a:lvl8pPr>
             <a:lvl9pPr marL="3657600" indent="0">
               <a:buNone/>
-              <a:defRPr sz="1000"/>
+              <a:defRPr sz="900"/>
             </a:lvl9pPr>
           </a:lstStyle>
           <a:p>
@@ -2349,9 +2505,9 @@
           <a:bodyPr/>
           <a:lstStyle/>
           <a:p>
-            <a:fld id="{4A289710-70DF-40F8-A2B9-9434EBD2088F}" type="datetimeFigureOut">
-              <a:rPr lang="en-US" smtClean="0"/>
-              <a:t>1/30/2019</a:t>
+            <a:fld id="{04289767-09B2-4866-9B3B-D1AEAB1DA3E5}" type="datetimeFigureOut">
+              <a:rPr lang="en-US" smtClean="0"/>
+              <a:t>2/4/2019</a:t>
             </a:fld>
             <a:endParaRPr lang="en-US"/>
           </a:p>
@@ -2391,7 +2547,7 @@
           <a:bodyPr/>
           <a:lstStyle/>
           <a:p>
-            <a:fld id="{BCF62446-E778-48A5-B6CD-BB906881C890}" type="slidenum">
+            <a:fld id="{AEC6CF53-C46E-4BE6-AC26-A5EBA637B3A1}" type="slidenum">
               <a:rPr lang="en-US" smtClean="0"/>
               <a:t>‹#›</a:t>
             </a:fld>
@@ -2402,7 +2558,7 @@
     </p:spTree>
     <p:extLst>
       <p:ext uri="{BB962C8B-B14F-4D97-AF65-F5344CB8AC3E}">
-        <p14:creationId xmlns:p14="http://schemas.microsoft.com/office/powerpoint/2010/main" val="3285393702"/>
+        <p14:creationId xmlns:p14="http://schemas.microsoft.com/office/powerpoint/2010/main" val="475190716"/>
       </p:ext>
     </p:extLst>
   </p:cSld>
@@ -2446,8 +2602,8 @@
         </p:nvSpPr>
         <p:spPr>
           <a:xfrm>
-            <a:off x="838200" y="365125"/>
-            <a:ext cx="10515600" cy="1325563"/>
+            <a:off x="457200" y="274638"/>
+            <a:ext cx="8229600" cy="1143000"/>
           </a:xfrm>
           <a:prstGeom prst="rect">
             <a:avLst/>
@@ -2479,8 +2635,8 @@
         </p:nvSpPr>
         <p:spPr>
           <a:xfrm>
-            <a:off x="838200" y="1825625"/>
-            <a:ext cx="10515600" cy="4351338"/>
+            <a:off x="457200" y="1600200"/>
+            <a:ext cx="8229600" cy="4525963"/>
           </a:xfrm>
           <a:prstGeom prst="rect">
             <a:avLst/>
@@ -2541,8 +2697,8 @@
         </p:nvSpPr>
         <p:spPr>
           <a:xfrm>
-            <a:off x="838200" y="6356350"/>
-            <a:ext cx="2743200" cy="365125"/>
+            <a:off x="457200" y="6356350"/>
+            <a:ext cx="2133600" cy="365125"/>
           </a:xfrm>
           <a:prstGeom prst="rect">
             <a:avLst/>
@@ -2562,9 +2718,9 @@
             </a:lvl1pPr>
           </a:lstStyle>
           <a:p>
-            <a:fld id="{4A289710-70DF-40F8-A2B9-9434EBD2088F}" type="datetimeFigureOut">
-              <a:rPr lang="en-US" smtClean="0"/>
-              <a:t>1/30/2019</a:t>
+            <a:fld id="{04289767-09B2-4866-9B3B-D1AEAB1DA3E5}" type="datetimeFigureOut">
+              <a:rPr lang="en-US" smtClean="0"/>
+              <a:t>2/4/2019</a:t>
             </a:fld>
             <a:endParaRPr lang="en-US"/>
           </a:p>
@@ -2582,8 +2738,8 @@
         </p:nvSpPr>
         <p:spPr>
           <a:xfrm>
-            <a:off x="4038600" y="6356350"/>
-            <a:ext cx="4114800" cy="365125"/>
+            <a:off x="3124200" y="6356350"/>
+            <a:ext cx="2895600" cy="365125"/>
           </a:xfrm>
           <a:prstGeom prst="rect">
             <a:avLst/>
@@ -2619,8 +2775,8 @@
         </p:nvSpPr>
         <p:spPr>
           <a:xfrm>
-            <a:off x="8610600" y="6356350"/>
-            <a:ext cx="2743200" cy="365125"/>
+            <a:off x="6553200" y="6356350"/>
+            <a:ext cx="2133600" cy="365125"/>
           </a:xfrm>
           <a:prstGeom prst="rect">
             <a:avLst/>
@@ -2640,7 +2796,7 @@
             </a:lvl1pPr>
           </a:lstStyle>
           <a:p>
-            <a:fld id="{BCF62446-E778-48A5-B6CD-BB906881C890}" type="slidenum">
+            <a:fld id="{AEC6CF53-C46E-4BE6-AC26-A5EBA637B3A1}" type="slidenum">
               <a:rPr lang="en-US" smtClean="0"/>
               <a:t>‹#›</a:t>
             </a:fld>
@@ -2651,7 +2807,7 @@
     </p:spTree>
     <p:extLst>
       <p:ext uri="{BB962C8B-B14F-4D97-AF65-F5344CB8AC3E}">
-        <p14:creationId xmlns:p14="http://schemas.microsoft.com/office/powerpoint/2010/main" val="52294277"/>
+        <p14:creationId xmlns:p14="http://schemas.microsoft.com/office/powerpoint/2010/main" val="608915575"/>
       </p:ext>
     </p:extLst>
   </p:cSld>
@@ -2671,10 +2827,7 @@
   </p:sldLayoutIdLst>
   <p:txStyles>
     <p:titleStyle>
-      <a:lvl1pPr algn="l" defTabSz="914400" rtl="0" eaLnBrk="1" latinLnBrk="0" hangingPunct="1">
-        <a:lnSpc>
-          <a:spcPct val="90000"/>
-        </a:lnSpc>
+      <a:lvl1pPr algn="ctr" defTabSz="914400" rtl="0" eaLnBrk="1" latinLnBrk="0" hangingPunct="1">
         <a:spcBef>
           <a:spcPct val="0"/>
         </a:spcBef>
@@ -2690,15 +2843,27 @@
       </a:lvl1pPr>
     </p:titleStyle>
     <p:bodyStyle>
-      <a:lvl1pPr marL="228600" indent="-228600" algn="l" defTabSz="914400" rtl="0" eaLnBrk="1" latinLnBrk="0" hangingPunct="1">
-        <a:lnSpc>
-          <a:spcPct val="90000"/>
-        </a:lnSpc>
+      <a:lvl1pPr marL="342900" indent="-342900" algn="l" defTabSz="914400" rtl="0" eaLnBrk="1" latinLnBrk="0" hangingPunct="1">
         <a:spcBef>
-          <a:spcPts val="1000"/>
+          <a:spcPct val="20000"/>
         </a:spcBef>
-        <a:buFont typeface="Arial" panose="020B0604020202020204" pitchFamily="34" charset="0"/>
+        <a:buFont typeface="Arial" pitchFamily="34" charset="0"/>
         <a:buChar char="•"/>
+        <a:defRPr sz="3200" kern="1200">
+          <a:solidFill>
+            <a:schemeClr val="tx1"/>
+          </a:solidFill>
+          <a:latin typeface="+mn-lt"/>
+          <a:ea typeface="+mn-ea"/>
+          <a:cs typeface="+mn-cs"/>
+        </a:defRPr>
+      </a:lvl1pPr>
+      <a:lvl2pPr marL="742950" indent="-285750" algn="l" defTabSz="914400" rtl="0" eaLnBrk="1" latinLnBrk="0" hangingPunct="1">
+        <a:spcBef>
+          <a:spcPct val="20000"/>
+        </a:spcBef>
+        <a:buFont typeface="Arial" pitchFamily="34" charset="0"/>
+        <a:buChar char="–"/>
         <a:defRPr sz="2800" kern="1200">
           <a:solidFill>
             <a:schemeClr val="tx1"/>
@@ -2707,15 +2872,12 @@
           <a:ea typeface="+mn-ea"/>
           <a:cs typeface="+mn-cs"/>
         </a:defRPr>
-      </a:lvl1pPr>
-      <a:lvl2pPr marL="685800" indent="-228600" algn="l" defTabSz="914400" rtl="0" eaLnBrk="1" latinLnBrk="0" hangingPunct="1">
-        <a:lnSpc>
-          <a:spcPct val="90000"/>
-        </a:lnSpc>
+      </a:lvl2pPr>
+      <a:lvl3pPr marL="1143000" indent="-228600" algn="l" defTabSz="914400" rtl="0" eaLnBrk="1" latinLnBrk="0" hangingPunct="1">
         <a:spcBef>
-          <a:spcPts val="500"/>
+          <a:spcPct val="20000"/>
         </a:spcBef>
-        <a:buFont typeface="Arial" panose="020B0604020202020204" pitchFamily="34" charset="0"/>
+        <a:buFont typeface="Arial" pitchFamily="34" charset="0"/>
         <a:buChar char="•"/>
         <a:defRPr sz="2400" kern="1200">
           <a:solidFill>
@@ -2725,15 +2887,42 @@
           <a:ea typeface="+mn-ea"/>
           <a:cs typeface="+mn-cs"/>
         </a:defRPr>
-      </a:lvl2pPr>
-      <a:lvl3pPr marL="1143000" indent="-228600" algn="l" defTabSz="914400" rtl="0" eaLnBrk="1" latinLnBrk="0" hangingPunct="1">
-        <a:lnSpc>
-          <a:spcPct val="90000"/>
-        </a:lnSpc>
+      </a:lvl3pPr>
+      <a:lvl4pPr marL="1600200" indent="-228600" algn="l" defTabSz="914400" rtl="0" eaLnBrk="1" latinLnBrk="0" hangingPunct="1">
         <a:spcBef>
-          <a:spcPts val="500"/>
+          <a:spcPct val="20000"/>
         </a:spcBef>
-        <a:buFont typeface="Arial" panose="020B0604020202020204" pitchFamily="34" charset="0"/>
+        <a:buFont typeface="Arial" pitchFamily="34" charset="0"/>
+        <a:buChar char="–"/>
+        <a:defRPr sz="2000" kern="1200">
+          <a:solidFill>
+            <a:schemeClr val="tx1"/>
+          </a:solidFill>
+          <a:latin typeface="+mn-lt"/>
+          <a:ea typeface="+mn-ea"/>
+          <a:cs typeface="+mn-cs"/>
+        </a:defRPr>
+      </a:lvl4pPr>
+      <a:lvl5pPr marL="2057400" indent="-228600" algn="l" defTabSz="914400" rtl="0" eaLnBrk="1" latinLnBrk="0" hangingPunct="1">
+        <a:spcBef>
+          <a:spcPct val="20000"/>
+        </a:spcBef>
+        <a:buFont typeface="Arial" pitchFamily="34" charset="0"/>
+        <a:buChar char="»"/>
+        <a:defRPr sz="2000" kern="1200">
+          <a:solidFill>
+            <a:schemeClr val="tx1"/>
+          </a:solidFill>
+          <a:latin typeface="+mn-lt"/>
+          <a:ea typeface="+mn-ea"/>
+          <a:cs typeface="+mn-cs"/>
+        </a:defRPr>
+      </a:lvl5pPr>
+      <a:lvl6pPr marL="2514600" indent="-228600" algn="l" defTabSz="914400" rtl="0" eaLnBrk="1" latinLnBrk="0" hangingPunct="1">
+        <a:spcBef>
+          <a:spcPct val="20000"/>
+        </a:spcBef>
+        <a:buFont typeface="Arial" pitchFamily="34" charset="0"/>
         <a:buChar char="•"/>
         <a:defRPr sz="2000" kern="1200">
           <a:solidFill>
@@ -2743,71 +2932,14 @@
           <a:ea typeface="+mn-ea"/>
           <a:cs typeface="+mn-cs"/>
         </a:defRPr>
-      </a:lvl3pPr>
-      <a:lvl4pPr marL="1600200" indent="-228600" algn="l" defTabSz="914400" rtl="0" eaLnBrk="1" latinLnBrk="0" hangingPunct="1">
-        <a:lnSpc>
-          <a:spcPct val="90000"/>
-        </a:lnSpc>
-        <a:spcBef>
-          <a:spcPts val="500"/>
-        </a:spcBef>
-        <a:buFont typeface="Arial" panose="020B0604020202020204" pitchFamily="34" charset="0"/>
-        <a:buChar char="•"/>
-        <a:defRPr sz="1800" kern="1200">
-          <a:solidFill>
-            <a:schemeClr val="tx1"/>
-          </a:solidFill>
-          <a:latin typeface="+mn-lt"/>
-          <a:ea typeface="+mn-ea"/>
-          <a:cs typeface="+mn-cs"/>
-        </a:defRPr>
-      </a:lvl4pPr>
-      <a:lvl5pPr marL="2057400" indent="-228600" algn="l" defTabSz="914400" rtl="0" eaLnBrk="1" latinLnBrk="0" hangingPunct="1">
-        <a:lnSpc>
-          <a:spcPct val="90000"/>
-        </a:lnSpc>
-        <a:spcBef>
-          <a:spcPts val="500"/>
-        </a:spcBef>
-        <a:buFont typeface="Arial" panose="020B0604020202020204" pitchFamily="34" charset="0"/>
-        <a:buChar char="•"/>
-        <a:defRPr sz="1800" kern="1200">
-          <a:solidFill>
-            <a:schemeClr val="tx1"/>
-          </a:solidFill>
-          <a:latin typeface="+mn-lt"/>
-          <a:ea typeface="+mn-ea"/>
-          <a:cs typeface="+mn-cs"/>
-        </a:defRPr>
-      </a:lvl5pPr>
-      <a:lvl6pPr marL="2514600" indent="-228600" algn="l" defTabSz="914400" rtl="0" eaLnBrk="1" latinLnBrk="0" hangingPunct="1">
-        <a:lnSpc>
-          <a:spcPct val="90000"/>
-        </a:lnSpc>
-        <a:spcBef>
-          <a:spcPts val="500"/>
-        </a:spcBef>
-        <a:buFont typeface="Arial" panose="020B0604020202020204" pitchFamily="34" charset="0"/>
-        <a:buChar char="•"/>
-        <a:defRPr sz="1800" kern="1200">
-          <a:solidFill>
-            <a:schemeClr val="tx1"/>
-          </a:solidFill>
-          <a:latin typeface="+mn-lt"/>
-          <a:ea typeface="+mn-ea"/>
-          <a:cs typeface="+mn-cs"/>
-        </a:defRPr>
       </a:lvl6pPr>
       <a:lvl7pPr marL="2971800" indent="-228600" algn="l" defTabSz="914400" rtl="0" eaLnBrk="1" latinLnBrk="0" hangingPunct="1">
-        <a:lnSpc>
-          <a:spcPct val="90000"/>
-        </a:lnSpc>
         <a:spcBef>
-          <a:spcPts val="500"/>
+          <a:spcPct val="20000"/>
         </a:spcBef>
-        <a:buFont typeface="Arial" panose="020B0604020202020204" pitchFamily="34" charset="0"/>
+        <a:buFont typeface="Arial" pitchFamily="34" charset="0"/>
         <a:buChar char="•"/>
-        <a:defRPr sz="1800" kern="1200">
+        <a:defRPr sz="2000" kern="1200">
           <a:solidFill>
             <a:schemeClr val="tx1"/>
           </a:solidFill>
@@ -2817,15 +2949,12 @@
         </a:defRPr>
       </a:lvl7pPr>
       <a:lvl8pPr marL="3429000" indent="-228600" algn="l" defTabSz="914400" rtl="0" eaLnBrk="1" latinLnBrk="0" hangingPunct="1">
-        <a:lnSpc>
-          <a:spcPct val="90000"/>
-        </a:lnSpc>
         <a:spcBef>
-          <a:spcPts val="500"/>
+          <a:spcPct val="20000"/>
         </a:spcBef>
-        <a:buFont typeface="Arial" panose="020B0604020202020204" pitchFamily="34" charset="0"/>
+        <a:buFont typeface="Arial" pitchFamily="34" charset="0"/>
         <a:buChar char="•"/>
-        <a:defRPr sz="1800" kern="1200">
+        <a:defRPr sz="2000" kern="1200">
           <a:solidFill>
             <a:schemeClr val="tx1"/>
           </a:solidFill>
@@ -2835,15 +2964,12 @@
         </a:defRPr>
       </a:lvl8pPr>
       <a:lvl9pPr marL="3886200" indent="-228600" algn="l" defTabSz="914400" rtl="0" eaLnBrk="1" latinLnBrk="0" hangingPunct="1">
-        <a:lnSpc>
-          <a:spcPct val="90000"/>
-        </a:lnSpc>
         <a:spcBef>
-          <a:spcPts val="500"/>
+          <a:spcPct val="20000"/>
         </a:spcBef>
-        <a:buFont typeface="Arial" panose="020B0604020202020204" pitchFamily="34" charset="0"/>
+        <a:buFont typeface="Arial" pitchFamily="34" charset="0"/>
         <a:buChar char="•"/>
-        <a:defRPr sz="1800" kern="1200">
+        <a:defRPr sz="2000" kern="1200">
           <a:solidFill>
             <a:schemeClr val="tx1"/>
           </a:solidFill>
@@ -2971,56 +3097,73 @@
       </p:grpSpPr>
       <p:sp>
         <p:nvSpPr>
-          <p:cNvPr id="2" name="Title 1"/>
-          <p:cNvSpPr>
-            <a:spLocks noGrp="1"/>
-          </p:cNvSpPr>
-          <p:nvPr>
-            <p:ph type="ctrTitle"/>
-          </p:nvPr>
+          <p:cNvPr id="4" name="Rectangle 3"/>
+          <p:cNvSpPr/>
+          <p:nvPr/>
         </p:nvSpPr>
         <p:spPr>
-          <a:gradFill>
+          <a:xfrm>
+            <a:off x="1475656" y="1484784"/>
+            <a:ext cx="3744416" cy="1872208"/>
+          </a:xfrm>
+          <a:prstGeom prst="rect">
+            <a:avLst/>
+          </a:prstGeom>
+          <a:gradFill rotWithShape="1">
             <a:gsLst>
               <a:gs pos="0">
-                <a:srgbClr val="828282"/>
+                <a:schemeClr val="bg1">
+                  <a:tint val="75000"/>
+                  <a:satMod val="150000"/>
+                </a:schemeClr>
               </a:gs>
               <a:gs pos="61000">
-                <a:schemeClr val="tx1"/>
+                <a:schemeClr val="bg1">
+                  <a:shade val="75000"/>
+                  <a:satMod val="100000"/>
+                </a:schemeClr>
               </a:gs>
               <a:gs pos="100000">
-                <a:schemeClr val="tx1"/>
+                <a:schemeClr val="bg1">
+                  <a:shade val="35000"/>
+                  <a:satMod val="100000"/>
+                </a:schemeClr>
               </a:gs>
             </a:gsLst>
             <a:path path="circle">
-              <a:fillToRect l="50000" t="175000" r="50000" b="-75000"/>
+              <a:fillToRect l="50000" t="150000" r="50000" b="-50000"/>
             </a:path>
           </a:gradFill>
         </p:spPr>
-        <p:txBody>
-          <a:bodyPr/>
-          <a:lstStyle/>
-          <a:p>
-            <a:r>
-              <a:rPr lang="en-US" dirty="0" smtClean="0">
-                <a:solidFill>
-                  <a:schemeClr val="bg1"/>
-                </a:solidFill>
-              </a:rPr>
-              <a:t>test</a:t>
-            </a:r>
-            <a:endParaRPr lang="en-US" dirty="0">
-              <a:solidFill>
-                <a:schemeClr val="bg1"/>
-              </a:solidFill>
-            </a:endParaRPr>
+        <p:style>
+          <a:lnRef idx="2">
+            <a:schemeClr val="accent1">
+              <a:shade val="50000"/>
+            </a:schemeClr>
+          </a:lnRef>
+          <a:fillRef idx="1">
+            <a:schemeClr val="accent1"/>
+          </a:fillRef>
+          <a:effectRef idx="0">
+            <a:schemeClr val="accent1"/>
+          </a:effectRef>
+          <a:fontRef idx="minor">
+            <a:schemeClr val="lt1"/>
+          </a:fontRef>
+        </p:style>
+        <p:txBody>
+          <a:bodyPr rtlCol="0" anchor="ctr"/>
+          <a:lstStyle/>
+          <a:p>
+            <a:pPr algn="ctr"/>
+            <a:endParaRPr lang="en-US"/>
           </a:p>
         </p:txBody>
       </p:sp>
     </p:spTree>
     <p:extLst>
       <p:ext uri="{BB962C8B-B14F-4D97-AF65-F5344CB8AC3E}">
-        <p14:creationId xmlns:p14="http://schemas.microsoft.com/office/powerpoint/2010/main" val="67642549"/>
+        <p14:creationId xmlns:p14="http://schemas.microsoft.com/office/powerpoint/2010/main" val="2856795108"/>
       </p:ext>
     </p:extLst>
   </p:cSld>
@@ -3038,42 +3181,42 @@
         <a:sysClr val="windowText" lastClr="000000"/>
       </a:dk1>
       <a:lt1>
-        <a:sysClr val="window" lastClr="FFFFFF"/>
+        <a:srgbClr val="000000"/>
       </a:lt1>
       <a:dk2>
-        <a:srgbClr val="44546A"/>
+        <a:srgbClr val="1F497D"/>
       </a:dk2>
       <a:lt2>
-        <a:srgbClr val="E7E6E6"/>
+        <a:srgbClr val="EEECE1"/>
       </a:lt2>
       <a:accent1>
-        <a:srgbClr val="5B9BD5"/>
+        <a:srgbClr val="4F81BD"/>
       </a:accent1>
       <a:accent2>
-        <a:srgbClr val="ED7D31"/>
+        <a:srgbClr val="C0504D"/>
       </a:accent2>
       <a:accent3>
-        <a:srgbClr val="A5A5A5"/>
+        <a:srgbClr val="9BBB59"/>
       </a:accent3>
       <a:accent4>
-        <a:srgbClr val="FFC000"/>
+        <a:srgbClr val="8064A2"/>
       </a:accent4>
       <a:accent5>
-        <a:srgbClr val="4472C4"/>
+        <a:srgbClr val="4BACC6"/>
       </a:accent5>
       <a:accent6>
-        <a:srgbClr val="70AD47"/>
+        <a:srgbClr val="F79646"/>
       </a:accent6>
       <a:hlink>
-        <a:srgbClr val="0563C1"/>
+        <a:srgbClr val="0000FF"/>
       </a:hlink>
       <a:folHlink>
-        <a:srgbClr val="954F72"/>
+        <a:srgbClr val="800080"/>
       </a:folHlink>
     </a:clrScheme>
     <a:fontScheme name="Office">
       <a:majorFont>
-        <a:latin typeface="Calibri Light"/>
+        <a:latin typeface="Calibri"/>
         <a:ea typeface=""/>
         <a:cs typeface=""/>
         <a:font script="Jpan" typeface="ＭＳ Ｐゴシック"/>
@@ -3152,141 +3295,165 @@
           <a:gsLst>
             <a:gs pos="0">
               <a:schemeClr val="phClr">
-                <a:lumMod val="110000"/>
-                <a:satMod val="105000"/>
-                <a:tint val="67000"/>
+                <a:tint val="50000"/>
+                <a:satMod val="300000"/>
               </a:schemeClr>
             </a:gs>
-            <a:gs pos="50000">
+            <a:gs pos="35000">
               <a:schemeClr val="phClr">
-                <a:lumMod val="105000"/>
-                <a:satMod val="103000"/>
-                <a:tint val="73000"/>
+                <a:tint val="37000"/>
+                <a:satMod val="300000"/>
               </a:schemeClr>
             </a:gs>
             <a:gs pos="100000">
               <a:schemeClr val="phClr">
-                <a:lumMod val="105000"/>
-                <a:satMod val="109000"/>
-                <a:tint val="81000"/>
+                <a:tint val="15000"/>
+                <a:satMod val="350000"/>
               </a:schemeClr>
             </a:gs>
           </a:gsLst>
-          <a:lin ang="5400000" scaled="0"/>
+          <a:lin ang="16200000" scaled="1"/>
         </a:gradFill>
         <a:gradFill rotWithShape="1">
           <a:gsLst>
             <a:gs pos="0">
               <a:schemeClr val="phClr">
-                <a:satMod val="103000"/>
-                <a:lumMod val="102000"/>
-                <a:tint val="94000"/>
+                <a:shade val="51000"/>
+                <a:satMod val="130000"/>
               </a:schemeClr>
             </a:gs>
-            <a:gs pos="50000">
+            <a:gs pos="80000">
               <a:schemeClr val="phClr">
-                <a:satMod val="110000"/>
-                <a:lumMod val="100000"/>
-                <a:shade val="100000"/>
+                <a:shade val="93000"/>
+                <a:satMod val="130000"/>
               </a:schemeClr>
             </a:gs>
             <a:gs pos="100000">
               <a:schemeClr val="phClr">
-                <a:lumMod val="99000"/>
-                <a:satMod val="120000"/>
-                <a:shade val="78000"/>
+                <a:shade val="94000"/>
+                <a:satMod val="135000"/>
               </a:schemeClr>
             </a:gs>
           </a:gsLst>
-          <a:lin ang="5400000" scaled="0"/>
+          <a:lin ang="16200000" scaled="0"/>
         </a:gradFill>
       </a:fillStyleLst>
       <a:lnStyleLst>
-        <a:ln w="6350" cap="flat" cmpd="sng" algn="ctr">
+        <a:ln w="9525" cap="flat" cmpd="sng" algn="ctr">
+          <a:solidFill>
+            <a:schemeClr val="phClr">
+              <a:shade val="95000"/>
+              <a:satMod val="105000"/>
+            </a:schemeClr>
+          </a:solidFill>
+          <a:prstDash val="solid"/>
+        </a:ln>
+        <a:ln w="25400" cap="flat" cmpd="sng" algn="ctr">
           <a:solidFill>
             <a:schemeClr val="phClr"/>
           </a:solidFill>
           <a:prstDash val="solid"/>
-          <a:miter lim="800000"/>
         </a:ln>
-        <a:ln w="12700" cap="flat" cmpd="sng" algn="ctr">
+        <a:ln w="38100" cap="flat" cmpd="sng" algn="ctr">
           <a:solidFill>
             <a:schemeClr val="phClr"/>
           </a:solidFill>
           <a:prstDash val="solid"/>
-          <a:miter lim="800000"/>
-        </a:ln>
-        <a:ln w="19050" cap="flat" cmpd="sng" algn="ctr">
-          <a:solidFill>
-            <a:schemeClr val="phClr"/>
-          </a:solidFill>
-          <a:prstDash val="solid"/>
-          <a:miter lim="800000"/>
         </a:ln>
       </a:lnStyleLst>
       <a:effectStyleLst>
         <a:effectStyle>
-          <a:effectLst/>
-        </a:effectStyle>
-        <a:effectStyle>
-          <a:effectLst/>
+          <a:effectLst>
+            <a:outerShdw blurRad="40000" dist="20000" dir="5400000" rotWithShape="0">
+              <a:srgbClr val="000000">
+                <a:alpha val="38000"/>
+              </a:srgbClr>
+            </a:outerShdw>
+          </a:effectLst>
         </a:effectStyle>
         <a:effectStyle>
           <a:effectLst>
-            <a:outerShdw blurRad="57150" dist="19050" dir="5400000" algn="ctr" rotWithShape="0">
+            <a:outerShdw blurRad="40000" dist="23000" dir="5400000" rotWithShape="0">
               <a:srgbClr val="000000">
-                <a:alpha val="63000"/>
+                <a:alpha val="35000"/>
               </a:srgbClr>
             </a:outerShdw>
           </a:effectLst>
+        </a:effectStyle>
+        <a:effectStyle>
+          <a:effectLst>
+            <a:outerShdw blurRad="40000" dist="23000" dir="5400000" rotWithShape="0">
+              <a:srgbClr val="000000">
+                <a:alpha val="35000"/>
+              </a:srgbClr>
+            </a:outerShdw>
+          </a:effectLst>
+          <a:scene3d>
+            <a:camera prst="orthographicFront">
+              <a:rot lat="0" lon="0" rev="0"/>
+            </a:camera>
+            <a:lightRig rig="threePt" dir="t">
+              <a:rot lat="0" lon="0" rev="1200000"/>
+            </a:lightRig>
+          </a:scene3d>
+          <a:sp3d>
+            <a:bevelT w="63500" h="25400"/>
+          </a:sp3d>
         </a:effectStyle>
       </a:effectStyleLst>
       <a:bgFillStyleLst>
         <a:solidFill>
           <a:schemeClr val="phClr"/>
         </a:solidFill>
-        <a:solidFill>
-          <a:schemeClr val="phClr">
-            <a:tint val="95000"/>
-            <a:satMod val="170000"/>
-          </a:schemeClr>
-        </a:solidFill>
         <a:gradFill rotWithShape="1">
           <a:gsLst>
             <a:gs pos="0">
               <a:schemeClr val="phClr">
-                <a:tint val="93000"/>
-                <a:satMod val="150000"/>
-                <a:shade val="98000"/>
-                <a:lumMod val="102000"/>
+                <a:tint val="40000"/>
+                <a:satMod val="350000"/>
               </a:schemeClr>
             </a:gs>
-            <a:gs pos="50000">
+            <a:gs pos="40000">
               <a:schemeClr val="phClr">
-                <a:tint val="98000"/>
-                <a:satMod val="130000"/>
-                <a:shade val="90000"/>
-                <a:lumMod val="103000"/>
+                <a:tint val="45000"/>
+                <a:shade val="99000"/>
+                <a:satMod val="350000"/>
               </a:schemeClr>
             </a:gs>
             <a:gs pos="100000">
               <a:schemeClr val="phClr">
-                <a:shade val="63000"/>
-                <a:satMod val="120000"/>
+                <a:shade val="20000"/>
+                <a:satMod val="255000"/>
               </a:schemeClr>
             </a:gs>
           </a:gsLst>
-          <a:lin ang="5400000" scaled="0"/>
+          <a:path path="circle">
+            <a:fillToRect l="50000" t="-80000" r="50000" b="180000"/>
+          </a:path>
+        </a:gradFill>
+        <a:gradFill rotWithShape="1">
+          <a:gsLst>
+            <a:gs pos="0">
+              <a:schemeClr val="phClr">
+                <a:tint val="80000"/>
+                <a:satMod val="300000"/>
+              </a:schemeClr>
+            </a:gs>
+            <a:gs pos="100000">
+              <a:schemeClr val="phClr">
+                <a:shade val="30000"/>
+                <a:satMod val="200000"/>
+              </a:schemeClr>
+            </a:gs>
+          </a:gsLst>
+          <a:path path="circle">
+            <a:fillToRect l="50000" t="50000" r="50000" b="50000"/>
+          </a:path>
         </a:gradFill>
       </a:bgFillStyleLst>
     </a:fmtScheme>
   </a:themeElements>
   <a:objectDefaults/>
   <a:extraClrSchemeLst/>
-  <a:extLst>
-    <a:ext uri="{05A4C25C-085E-4340-85A3-A5531E510DB2}">
-      <thm15:themeFamily xmlns:thm15="http://schemas.microsoft.com/office/thememl/2012/main" xmlns="" name="Office Theme" id="{62F939B6-93AF-4DB8-9C6B-D6C7DFDC589F}" vid="{4A3C46E8-61CC-4603-A589-7422A47A8E4A}"/>
-    </a:ext>
-  </a:extLst>
 </a:theme>
 </file>
</xml_diff>